<commit_message>
added Exception Handling code
</commit_message>
<xml_diff>
--- a/Day_6_Training.pptx
+++ b/Day_6_Training.pptx
@@ -121,7 +121,7 @@
   </p:defaultTextStyle>
   <p:extLst>
     <p:ext uri="{EFAFB233-063F-42B5-8137-9DF3F51BA10A}">
-      <p15:sldGuideLst xmlns:p15="http://schemas.microsoft.com/office/powerpoint/2012/main">
+      <p15:sldGuideLst xmlns:p15="http://schemas.microsoft.com/office/powerpoint/2012/main" xmlns="">
         <p15:guide id="1" orient="horz" pos="2160">
           <p15:clr>
             <a:srgbClr val="A4A3A4"/>
@@ -221,7 +221,7 @@
             <a:fld id="{2DFA8FBC-D085-4302-8AB4-CB22D5B87B17}" type="datetimeFigureOut">
               <a:rPr lang="en-US" smtClean="0"/>
               <a:pPr/>
-              <a:t>6/23/2018</a:t>
+              <a:t>24-Jun-18</a:t>
             </a:fld>
             <a:endParaRPr lang="en-US"/>
           </a:p>
@@ -389,7 +389,7 @@
     </p:spTree>
     <p:extLst>
       <p:ext uri="{BB962C8B-B14F-4D97-AF65-F5344CB8AC3E}">
-        <p14:creationId xmlns:p14="http://schemas.microsoft.com/office/powerpoint/2010/main" val="3868381238"/>
+        <p14:creationId xmlns:p14="http://schemas.microsoft.com/office/powerpoint/2010/main" xmlns="" val="3868381238"/>
       </p:ext>
     </p:extLst>
   </p:cSld>
@@ -619,7 +619,7 @@
             <a:fld id="{635C9E52-7876-4467-B2E3-4E8A0FFE6CA5}" type="datetimeFigureOut">
               <a:rPr lang="en-US" smtClean="0"/>
               <a:pPr/>
-              <a:t>6/23/2018</a:t>
+              <a:t>24-Jun-18</a:t>
             </a:fld>
             <a:endParaRPr lang="en-US"/>
           </a:p>
@@ -671,7 +671,7 @@
     </p:spTree>
     <p:extLst>
       <p:ext uri="{BB962C8B-B14F-4D97-AF65-F5344CB8AC3E}">
-        <p14:creationId xmlns:p14="http://schemas.microsoft.com/office/powerpoint/2010/main" val="3169153744"/>
+        <p14:creationId xmlns:p14="http://schemas.microsoft.com/office/powerpoint/2010/main" xmlns="" val="3169153744"/>
       </p:ext>
     </p:extLst>
   </p:cSld>
@@ -789,7 +789,7 @@
             <a:fld id="{635C9E52-7876-4467-B2E3-4E8A0FFE6CA5}" type="datetimeFigureOut">
               <a:rPr lang="en-US" smtClean="0"/>
               <a:pPr/>
-              <a:t>6/23/2018</a:t>
+              <a:t>24-Jun-18</a:t>
             </a:fld>
             <a:endParaRPr lang="en-US"/>
           </a:p>
@@ -841,7 +841,7 @@
     </p:spTree>
     <p:extLst>
       <p:ext uri="{BB962C8B-B14F-4D97-AF65-F5344CB8AC3E}">
-        <p14:creationId xmlns:p14="http://schemas.microsoft.com/office/powerpoint/2010/main" val="1593433582"/>
+        <p14:creationId xmlns:p14="http://schemas.microsoft.com/office/powerpoint/2010/main" xmlns="" val="1593433582"/>
       </p:ext>
     </p:extLst>
   </p:cSld>
@@ -969,7 +969,7 @@
             <a:fld id="{635C9E52-7876-4467-B2E3-4E8A0FFE6CA5}" type="datetimeFigureOut">
               <a:rPr lang="en-US" smtClean="0"/>
               <a:pPr/>
-              <a:t>6/23/2018</a:t>
+              <a:t>24-Jun-18</a:t>
             </a:fld>
             <a:endParaRPr lang="en-US"/>
           </a:p>
@@ -1021,7 +1021,7 @@
     </p:spTree>
     <p:extLst>
       <p:ext uri="{BB962C8B-B14F-4D97-AF65-F5344CB8AC3E}">
-        <p14:creationId xmlns:p14="http://schemas.microsoft.com/office/powerpoint/2010/main" val="2045208562"/>
+        <p14:creationId xmlns:p14="http://schemas.microsoft.com/office/powerpoint/2010/main" xmlns="" val="2045208562"/>
       </p:ext>
     </p:extLst>
   </p:cSld>
@@ -1139,7 +1139,7 @@
             <a:fld id="{635C9E52-7876-4467-B2E3-4E8A0FFE6CA5}" type="datetimeFigureOut">
               <a:rPr lang="en-US" smtClean="0"/>
               <a:pPr/>
-              <a:t>6/23/2018</a:t>
+              <a:t>24-Jun-18</a:t>
             </a:fld>
             <a:endParaRPr lang="en-US"/>
           </a:p>
@@ -1191,7 +1191,7 @@
     </p:spTree>
     <p:extLst>
       <p:ext uri="{BB962C8B-B14F-4D97-AF65-F5344CB8AC3E}">
-        <p14:creationId xmlns:p14="http://schemas.microsoft.com/office/powerpoint/2010/main" val="4062740986"/>
+        <p14:creationId xmlns:p14="http://schemas.microsoft.com/office/powerpoint/2010/main" xmlns="" val="4062740986"/>
       </p:ext>
     </p:extLst>
   </p:cSld>
@@ -1386,7 +1386,7 @@
             <a:fld id="{635C9E52-7876-4467-B2E3-4E8A0FFE6CA5}" type="datetimeFigureOut">
               <a:rPr lang="en-US" smtClean="0"/>
               <a:pPr/>
-              <a:t>6/23/2018</a:t>
+              <a:t>24-Jun-18</a:t>
             </a:fld>
             <a:endParaRPr lang="en-US"/>
           </a:p>
@@ -1438,7 +1438,7 @@
     </p:spTree>
     <p:extLst>
       <p:ext uri="{BB962C8B-B14F-4D97-AF65-F5344CB8AC3E}">
-        <p14:creationId xmlns:p14="http://schemas.microsoft.com/office/powerpoint/2010/main" val="3710308980"/>
+        <p14:creationId xmlns:p14="http://schemas.microsoft.com/office/powerpoint/2010/main" xmlns="" val="3710308980"/>
       </p:ext>
     </p:extLst>
   </p:cSld>
@@ -1617,7 +1617,7 @@
             <a:fld id="{635C9E52-7876-4467-B2E3-4E8A0FFE6CA5}" type="datetimeFigureOut">
               <a:rPr lang="en-US" smtClean="0"/>
               <a:pPr/>
-              <a:t>6/23/2018</a:t>
+              <a:t>24-Jun-18</a:t>
             </a:fld>
             <a:endParaRPr lang="en-US"/>
           </a:p>
@@ -1669,7 +1669,7 @@
     </p:spTree>
     <p:extLst>
       <p:ext uri="{BB962C8B-B14F-4D97-AF65-F5344CB8AC3E}">
-        <p14:creationId xmlns:p14="http://schemas.microsoft.com/office/powerpoint/2010/main" val="999681537"/>
+        <p14:creationId xmlns:p14="http://schemas.microsoft.com/office/powerpoint/2010/main" xmlns="" val="999681537"/>
       </p:ext>
     </p:extLst>
   </p:cSld>
@@ -1983,7 +1983,7 @@
             <a:fld id="{635C9E52-7876-4467-B2E3-4E8A0FFE6CA5}" type="datetimeFigureOut">
               <a:rPr lang="en-US" smtClean="0"/>
               <a:pPr/>
-              <a:t>6/23/2018</a:t>
+              <a:t>24-Jun-18</a:t>
             </a:fld>
             <a:endParaRPr lang="en-US"/>
           </a:p>
@@ -2035,7 +2035,7 @@
     </p:spTree>
     <p:extLst>
       <p:ext uri="{BB962C8B-B14F-4D97-AF65-F5344CB8AC3E}">
-        <p14:creationId xmlns:p14="http://schemas.microsoft.com/office/powerpoint/2010/main" val="2604405924"/>
+        <p14:creationId xmlns:p14="http://schemas.microsoft.com/office/powerpoint/2010/main" xmlns="" val="2604405924"/>
       </p:ext>
     </p:extLst>
   </p:cSld>
@@ -2102,7 +2102,7 @@
             <a:fld id="{635C9E52-7876-4467-B2E3-4E8A0FFE6CA5}" type="datetimeFigureOut">
               <a:rPr lang="en-US" smtClean="0"/>
               <a:pPr/>
-              <a:t>6/23/2018</a:t>
+              <a:t>24-Jun-18</a:t>
             </a:fld>
             <a:endParaRPr lang="en-US"/>
           </a:p>
@@ -2154,7 +2154,7 @@
     </p:spTree>
     <p:extLst>
       <p:ext uri="{BB962C8B-B14F-4D97-AF65-F5344CB8AC3E}">
-        <p14:creationId xmlns:p14="http://schemas.microsoft.com/office/powerpoint/2010/main" val="3598578073"/>
+        <p14:creationId xmlns:p14="http://schemas.microsoft.com/office/powerpoint/2010/main" xmlns="" val="3598578073"/>
       </p:ext>
     </p:extLst>
   </p:cSld>
@@ -2199,7 +2199,7 @@
             <a:fld id="{635C9E52-7876-4467-B2E3-4E8A0FFE6CA5}" type="datetimeFigureOut">
               <a:rPr lang="en-US" smtClean="0"/>
               <a:pPr/>
-              <a:t>6/23/2018</a:t>
+              <a:t>24-Jun-18</a:t>
             </a:fld>
             <a:endParaRPr lang="en-US"/>
           </a:p>
@@ -2251,7 +2251,7 @@
     </p:spTree>
     <p:extLst>
       <p:ext uri="{BB962C8B-B14F-4D97-AF65-F5344CB8AC3E}">
-        <p14:creationId xmlns:p14="http://schemas.microsoft.com/office/powerpoint/2010/main" val="1343340343"/>
+        <p14:creationId xmlns:p14="http://schemas.microsoft.com/office/powerpoint/2010/main" xmlns="" val="1343340343"/>
       </p:ext>
     </p:extLst>
   </p:cSld>
@@ -2476,7 +2476,7 @@
             <a:fld id="{635C9E52-7876-4467-B2E3-4E8A0FFE6CA5}" type="datetimeFigureOut">
               <a:rPr lang="en-US" smtClean="0"/>
               <a:pPr/>
-              <a:t>6/23/2018</a:t>
+              <a:t>24-Jun-18</a:t>
             </a:fld>
             <a:endParaRPr lang="en-US"/>
           </a:p>
@@ -2528,7 +2528,7 @@
     </p:spTree>
     <p:extLst>
       <p:ext uri="{BB962C8B-B14F-4D97-AF65-F5344CB8AC3E}">
-        <p14:creationId xmlns:p14="http://schemas.microsoft.com/office/powerpoint/2010/main" val="366575480"/>
+        <p14:creationId xmlns:p14="http://schemas.microsoft.com/office/powerpoint/2010/main" xmlns="" val="366575480"/>
       </p:ext>
     </p:extLst>
   </p:cSld>
@@ -2730,7 +2730,7 @@
             <a:fld id="{635C9E52-7876-4467-B2E3-4E8A0FFE6CA5}" type="datetimeFigureOut">
               <a:rPr lang="en-US" smtClean="0"/>
               <a:pPr/>
-              <a:t>6/23/2018</a:t>
+              <a:t>24-Jun-18</a:t>
             </a:fld>
             <a:endParaRPr lang="en-US"/>
           </a:p>
@@ -2782,7 +2782,7 @@
     </p:spTree>
     <p:extLst>
       <p:ext uri="{BB962C8B-B14F-4D97-AF65-F5344CB8AC3E}">
-        <p14:creationId xmlns:p14="http://schemas.microsoft.com/office/powerpoint/2010/main" val="3892718129"/>
+        <p14:creationId xmlns:p14="http://schemas.microsoft.com/office/powerpoint/2010/main" xmlns="" val="3892718129"/>
       </p:ext>
     </p:extLst>
   </p:cSld>
@@ -2943,7 +2943,7 @@
             <a:fld id="{635C9E52-7876-4467-B2E3-4E8A0FFE6CA5}" type="datetimeFigureOut">
               <a:rPr lang="en-US" smtClean="0"/>
               <a:pPr/>
-              <a:t>6/23/2018</a:t>
+              <a:t>24-Jun-18</a:t>
             </a:fld>
             <a:endParaRPr lang="en-US"/>
           </a:p>
@@ -3031,7 +3031,7 @@
     </p:spTree>
     <p:extLst>
       <p:ext uri="{BB962C8B-B14F-4D97-AF65-F5344CB8AC3E}">
-        <p14:creationId xmlns:p14="http://schemas.microsoft.com/office/powerpoint/2010/main" val="228264506"/>
+        <p14:creationId xmlns:p14="http://schemas.microsoft.com/office/powerpoint/2010/main" xmlns="" val="228264506"/>
       </p:ext>
     </p:extLst>
   </p:cSld>
@@ -3415,7 +3415,7 @@
     </p:spTree>
     <p:extLst>
       <p:ext uri="{BB962C8B-B14F-4D97-AF65-F5344CB8AC3E}">
-        <p14:creationId xmlns:p14="http://schemas.microsoft.com/office/powerpoint/2010/main" val="1556894194"/>
+        <p14:creationId xmlns:p14="http://schemas.microsoft.com/office/powerpoint/2010/main" xmlns="" val="1556894194"/>
       </p:ext>
     </p:extLst>
   </p:cSld>
@@ -3698,7 +3698,7 @@
     </p:spTree>
     <p:extLst>
       <p:ext uri="{BB962C8B-B14F-4D97-AF65-F5344CB8AC3E}">
-        <p14:creationId xmlns:p14="http://schemas.microsoft.com/office/powerpoint/2010/main" val="3716271601"/>
+        <p14:creationId xmlns:p14="http://schemas.microsoft.com/office/powerpoint/2010/main" xmlns="" val="3716271601"/>
       </p:ext>
     </p:extLst>
   </p:cSld>
@@ -3889,7 +3889,7 @@
     </p:spTree>
     <p:extLst>
       <p:ext uri="{BB962C8B-B14F-4D97-AF65-F5344CB8AC3E}">
-        <p14:creationId xmlns:p14="http://schemas.microsoft.com/office/powerpoint/2010/main" val="3879736811"/>
+        <p14:creationId xmlns:p14="http://schemas.microsoft.com/office/powerpoint/2010/main" xmlns="" val="3879736811"/>
       </p:ext>
     </p:extLst>
   </p:cSld>
@@ -3935,7 +3935,6 @@
               <a:rPr lang="en-US" dirty="0"/>
               <a:t>Code Example – Common Library</a:t>
             </a:r>
-            <a:endParaRPr lang="en-US" dirty="0"/>
           </a:p>
         </p:txBody>
       </p:sp>
@@ -4046,7 +4045,7 @@
     </p:spTree>
     <p:extLst>
       <p:ext uri="{BB962C8B-B14F-4D97-AF65-F5344CB8AC3E}">
-        <p14:creationId xmlns:p14="http://schemas.microsoft.com/office/powerpoint/2010/main" val="133295989"/>
+        <p14:creationId xmlns:p14="http://schemas.microsoft.com/office/powerpoint/2010/main" xmlns="" val="133295989"/>
       </p:ext>
     </p:extLst>
   </p:cSld>
@@ -4092,7 +4091,6 @@
               <a:rPr lang="en-US" dirty="0"/>
               <a:t>Code Example – Common Library</a:t>
             </a:r>
-            <a:endParaRPr lang="en-US" dirty="0"/>
           </a:p>
         </p:txBody>
       </p:sp>
@@ -4277,7 +4275,7 @@
     </p:spTree>
     <p:extLst>
       <p:ext uri="{BB962C8B-B14F-4D97-AF65-F5344CB8AC3E}">
-        <p14:creationId xmlns:p14="http://schemas.microsoft.com/office/powerpoint/2010/main" val="3824310605"/>
+        <p14:creationId xmlns:p14="http://schemas.microsoft.com/office/powerpoint/2010/main" xmlns="" val="3824310605"/>
       </p:ext>
     </p:extLst>
   </p:cSld>
@@ -4370,7 +4368,7 @@
     </p:spTree>
     <p:extLst>
       <p:ext uri="{BB962C8B-B14F-4D97-AF65-F5344CB8AC3E}">
-        <p14:creationId xmlns:p14="http://schemas.microsoft.com/office/powerpoint/2010/main" val="507773474"/>
+        <p14:creationId xmlns:p14="http://schemas.microsoft.com/office/powerpoint/2010/main" xmlns="" val="507773474"/>
       </p:ext>
     </p:extLst>
   </p:cSld>
@@ -4604,7 +4602,7 @@
     </p:spTree>
     <p:extLst>
       <p:ext uri="{BB962C8B-B14F-4D97-AF65-F5344CB8AC3E}">
-        <p14:creationId xmlns:p14="http://schemas.microsoft.com/office/powerpoint/2010/main" val="3245321991"/>
+        <p14:creationId xmlns:p14="http://schemas.microsoft.com/office/powerpoint/2010/main" xmlns="" val="3245321991"/>
       </p:ext>
     </p:extLst>
   </p:cSld>
@@ -4836,7 +4834,7 @@
     </p:spTree>
     <p:extLst>
       <p:ext uri="{BB962C8B-B14F-4D97-AF65-F5344CB8AC3E}">
-        <p14:creationId xmlns:p14="http://schemas.microsoft.com/office/powerpoint/2010/main" val="2328782421"/>
+        <p14:creationId xmlns:p14="http://schemas.microsoft.com/office/powerpoint/2010/main" xmlns="" val="2328782421"/>
       </p:ext>
     </p:extLst>
   </p:cSld>
@@ -4946,7 +4944,7 @@
     </p:spTree>
     <p:extLst>
       <p:ext uri="{BB962C8B-B14F-4D97-AF65-F5344CB8AC3E}">
-        <p14:creationId xmlns:p14="http://schemas.microsoft.com/office/powerpoint/2010/main" val="847158410"/>
+        <p14:creationId xmlns:p14="http://schemas.microsoft.com/office/powerpoint/2010/main" xmlns="" val="847158410"/>
       </p:ext>
     </p:extLst>
   </p:cSld>
@@ -5227,7 +5225,7 @@
     </p:spTree>
     <p:extLst>
       <p:ext uri="{BB962C8B-B14F-4D97-AF65-F5344CB8AC3E}">
-        <p14:creationId xmlns:p14="http://schemas.microsoft.com/office/powerpoint/2010/main" val="3274927514"/>
+        <p14:creationId xmlns:p14="http://schemas.microsoft.com/office/powerpoint/2010/main" xmlns="" val="3274927514"/>
       </p:ext>
     </p:extLst>
   </p:cSld>
@@ -5361,14 +5359,13 @@
               <a:rPr lang="en-US" dirty="0"/>
               <a:t>print "Great, you successfully entered an integer!"</a:t>
             </a:r>
-            <a:endParaRPr lang="en-US" dirty="0"/>
           </a:p>
         </p:txBody>
       </p:sp>
     </p:spTree>
     <p:extLst>
       <p:ext uri="{BB962C8B-B14F-4D97-AF65-F5344CB8AC3E}">
-        <p14:creationId xmlns:p14="http://schemas.microsoft.com/office/powerpoint/2010/main" val="2398775230"/>
+        <p14:creationId xmlns:p14="http://schemas.microsoft.com/office/powerpoint/2010/main" xmlns="" val="2398775230"/>
       </p:ext>
     </p:extLst>
   </p:cSld>
@@ -5692,7 +5689,7 @@
     </p:spTree>
     <p:extLst>
       <p:ext uri="{BB962C8B-B14F-4D97-AF65-F5344CB8AC3E}">
-        <p14:creationId xmlns:p14="http://schemas.microsoft.com/office/powerpoint/2010/main" val="4218827962"/>
+        <p14:creationId xmlns:p14="http://schemas.microsoft.com/office/powerpoint/2010/main" xmlns="" val="4218827962"/>
       </p:ext>
     </p:extLst>
   </p:cSld>
@@ -5736,7 +5733,15 @@
           <a:p>
             <a:r>
               <a:rPr lang="en-US" dirty="0"/>
-              <a:t>Creating Customer Exception</a:t>
+              <a:t>Creating </a:t>
+            </a:r>
+            <a:r>
+              <a:rPr lang="en-US" dirty="0" smtClean="0"/>
+              <a:t>Customized </a:t>
+            </a:r>
+            <a:r>
+              <a:rPr lang="en-US" dirty="0"/>
+              <a:t>Exception</a:t>
             </a:r>
           </a:p>
         </p:txBody>
@@ -5851,7 +5856,7 @@
     </p:spTree>
     <p:extLst>
       <p:ext uri="{BB962C8B-B14F-4D97-AF65-F5344CB8AC3E}">
-        <p14:creationId xmlns:p14="http://schemas.microsoft.com/office/powerpoint/2010/main" val="4260590828"/>
+        <p14:creationId xmlns:p14="http://schemas.microsoft.com/office/powerpoint/2010/main" xmlns="" val="4260590828"/>
       </p:ext>
     </p:extLst>
   </p:cSld>
@@ -6150,7 +6155,7 @@
   <a:extraClrSchemeLst/>
   <a:extLst>
     <a:ext uri="{05A4C25C-085E-4340-85A3-A5531E510DB2}">
-      <thm15:themeFamily xmlns:thm15="http://schemas.microsoft.com/office/thememl/2012/main" name="Office Theme" id="{62F939B6-93AF-4DB8-9C6B-D6C7DFDC589F}" vid="{4A3C46E8-61CC-4603-A589-7422A47A8E4A}"/>
+      <thm15:themeFamily xmlns:thm15="http://schemas.microsoft.com/office/thememl/2012/main" xmlns="" name="Office Theme" id="{62F939B6-93AF-4DB8-9C6B-D6C7DFDC589F}" vid="{4A3C46E8-61CC-4603-A589-7422A47A8E4A}"/>
     </a:ext>
   </a:extLst>
 </a:theme>
@@ -6445,7 +6450,7 @@
   <a:extraClrSchemeLst/>
   <a:extLst>
     <a:ext uri="{05A4C25C-085E-4340-85A3-A5531E510DB2}">
-      <thm15:themeFamily xmlns:thm15="http://schemas.microsoft.com/office/thememl/2012/main" name="Office Theme" id="{62F939B6-93AF-4DB8-9C6B-D6C7DFDC589F}" vid="{4A3C46E8-61CC-4603-A589-7422A47A8E4A}"/>
+      <thm15:themeFamily xmlns:thm15="http://schemas.microsoft.com/office/thememl/2012/main" xmlns="" name="Office Theme" id="{62F939B6-93AF-4DB8-9C6B-D6C7DFDC589F}" vid="{4A3C46E8-61CC-4603-A589-7422A47A8E4A}"/>
     </a:ext>
   </a:extLst>
 </a:theme>

</xml_diff>